<commit_message>
added future feature slides
</commit_message>
<xml_diff>
--- a/FinalPresentation.pptx
+++ b/FinalPresentation.pptx
@@ -22,8 +22,8 @@
     <p:sldId id="327" r:id="rId10"/>
     <p:sldId id="313" r:id="rId11"/>
     <p:sldId id="315" r:id="rId12"/>
-    <p:sldId id="314" r:id="rId13"/>
-    <p:sldId id="322" r:id="rId14"/>
+    <p:sldId id="328" r:id="rId13"/>
+    <p:sldId id="329" r:id="rId14"/>
     <p:sldId id="323" r:id="rId15"/>
   </p:sldIdLst>
   <p:sldSz cx="12192000" cy="6858000"/>
@@ -1055,7 +1055,7 @@
     </p:spTree>
     <p:extLst>
       <p:ext uri="{BB962C8B-B14F-4D97-AF65-F5344CB8AC3E}">
-        <p14:creationId xmlns:p14="http://schemas.microsoft.com/office/powerpoint/2010/main" val="50651109"/>
+        <p14:creationId xmlns:p14="http://schemas.microsoft.com/office/powerpoint/2010/main" val="3999712614"/>
       </p:ext>
     </p:extLst>
   </p:cSld>
@@ -1145,7 +1145,7 @@
     </p:spTree>
     <p:extLst>
       <p:ext uri="{BB962C8B-B14F-4D97-AF65-F5344CB8AC3E}">
-        <p14:creationId xmlns:p14="http://schemas.microsoft.com/office/powerpoint/2010/main" val="597259050"/>
+        <p14:creationId xmlns:p14="http://schemas.microsoft.com/office/powerpoint/2010/main" val="1824691197"/>
       </p:ext>
     </p:extLst>
   </p:cSld>
@@ -39368,7 +39368,49 @@
           <a:bodyPr/>
           <a:lstStyle/>
           <a:p>
-            <a:endParaRPr lang="en-US"/>
+            <a:r>
+              <a:rPr lang="en-US" dirty="0" smtClean="0"/>
+              <a:t>Draft capabilities</a:t>
+            </a:r>
+          </a:p>
+          <a:p>
+            <a:r>
+              <a:rPr lang="en-US" dirty="0" smtClean="0"/>
+              <a:t>Post  management</a:t>
+            </a:r>
+          </a:p>
+          <a:p>
+            <a:r>
+              <a:rPr lang="en-US" dirty="0" smtClean="0"/>
+              <a:t>Rich text </a:t>
+            </a:r>
+            <a:r>
+              <a:rPr lang="en-US" dirty="0"/>
+              <a:t>e</a:t>
+            </a:r>
+            <a:r>
+              <a:rPr lang="en-US" dirty="0" smtClean="0"/>
+              <a:t>ditor </a:t>
+            </a:r>
+            <a:r>
+              <a:rPr lang="en-US" dirty="0"/>
+              <a:t>c</a:t>
+            </a:r>
+            <a:r>
+              <a:rPr lang="en-US" dirty="0" smtClean="0"/>
+              <a:t>omments</a:t>
+            </a:r>
+          </a:p>
+          <a:p>
+            <a:r>
+              <a:rPr lang="en-US" dirty="0" smtClean="0"/>
+              <a:t>Replies </a:t>
+            </a:r>
+            <a:r>
+              <a:rPr lang="en-US" smtClean="0"/>
+              <a:t>for comments</a:t>
+            </a:r>
+            <a:endParaRPr lang="en-US" dirty="0"/>
           </a:p>
         </p:txBody>
       </p:sp>
@@ -39484,7 +39526,7 @@
     </p:spTree>
     <p:extLst>
       <p:ext uri="{BB962C8B-B14F-4D97-AF65-F5344CB8AC3E}">
-        <p14:creationId xmlns:p14="http://schemas.microsoft.com/office/powerpoint/2010/main" val="3259647526"/>
+        <p14:creationId xmlns:p14="http://schemas.microsoft.com/office/powerpoint/2010/main" val="3099042865"/>
       </p:ext>
     </p:extLst>
   </p:cSld>
@@ -39533,7 +39575,22 @@
           <a:bodyPr/>
           <a:lstStyle/>
           <a:p>
-            <a:endParaRPr lang="en-US"/>
+            <a:r>
+              <a:rPr lang="en-US" dirty="0" smtClean="0"/>
+              <a:t>Comment boxes</a:t>
+            </a:r>
+          </a:p>
+          <a:p>
+            <a:r>
+              <a:rPr lang="en-US" dirty="0" smtClean="0"/>
+              <a:t>Email notifications</a:t>
+            </a:r>
+          </a:p>
+          <a:p>
+            <a:r>
+              <a:rPr lang="en-US" dirty="0" smtClean="0"/>
+              <a:t>Gradebook</a:t>
+            </a:r>
           </a:p>
         </p:txBody>
       </p:sp>
@@ -39649,7 +39706,7 @@
     </p:spTree>
     <p:extLst>
       <p:ext uri="{BB962C8B-B14F-4D97-AF65-F5344CB8AC3E}">
-        <p14:creationId xmlns:p14="http://schemas.microsoft.com/office/powerpoint/2010/main" val="3902528447"/>
+        <p14:creationId xmlns:p14="http://schemas.microsoft.com/office/powerpoint/2010/main" val="1566763832"/>
       </p:ext>
     </p:extLst>
   </p:cSld>

</xml_diff>